<commit_message>
Update DG for Import/Export to make it clearer.
</commit_message>
<xml_diff>
--- a/docs/diagrams/ImportConflictResolverSequenceDiagram.pptx
+++ b/docs/diagrams/ImportConflictResolverSequenceDiagram.pptx
@@ -124,10 +124,6 @@
     </p:ext>
   </p:extLst>
 </p:presentation>
-</file>
-
-<file path=ppt/revisionInfo.xml><?xml version="1.0" encoding="utf-8"?>
-<p1510:revInfo xmlns:a="http://schemas.openxmlformats.org/drawingml/2006/main" xmlns:r="http://schemas.openxmlformats.org/officeDocument/2006/relationships" xmlns:p1510="http://schemas.microsoft.com/office/powerpoint/2015/10/main"/>
 </file>
 
 <file path=ppt/notesMasters/notesMaster1.xml><?xml version="1.0" encoding="utf-8"?>
@@ -3492,7 +3488,7 @@
           <a:lstStyle/>
           <a:p>
             <a:r>
-              <a:rPr lang="en-US" sz="1200" b="1" dirty="0" smtClean="0">
+              <a:rPr lang="en-US" sz="1200" b="1" dirty="0">
                 <a:solidFill>
                   <a:srgbClr val="7030A0"/>
                 </a:solidFill>
@@ -3572,9 +3568,7 @@
           </a:solidFill>
           <a:ln w="19050">
             <a:solidFill>
-              <a:schemeClr val="accent6">
-                <a:lumMod val="50000"/>
-              </a:schemeClr>
+              <a:srgbClr val="7030A0"/>
             </a:solidFill>
           </a:ln>
           <a:effectLst/>
@@ -3599,7 +3593,7 @@
           <a:p>
             <a:pPr algn="ctr"/>
             <a:r>
-              <a:rPr lang="en-US" sz="1500" dirty="0" smtClean="0">
+              <a:rPr lang="en-US" sz="1500" dirty="0">
                 <a:solidFill>
                   <a:schemeClr val="bg1"/>
                 </a:solidFill>
@@ -3607,7 +3601,7 @@
               <a:t>:</a:t>
             </a:r>
             <a:r>
-              <a:rPr lang="en-US" sz="1500" dirty="0" err="1" smtClean="0">
+              <a:rPr lang="en-US" sz="1500" dirty="0" err="1">
                 <a:solidFill>
                   <a:schemeClr val="bg1"/>
                 </a:solidFill>
@@ -3812,7 +3806,7 @@
           <a:p>
             <a:pPr algn="r"/>
             <a:r>
-              <a:rPr lang="en-US" sz="1000" dirty="0" err="1" smtClean="0">
+              <a:rPr lang="en-US" sz="1000" dirty="0" err="1">
                 <a:solidFill>
                   <a:schemeClr val="accent6">
                     <a:lumMod val="75000"/>
@@ -3821,18 +3815,8 @@
               </a:rPr>
               <a:t>handleImportData</a:t>
             </a:r>
-            <a:r>
-              <a:rPr lang="en-US" sz="1000" dirty="0" smtClean="0">
-                <a:solidFill>
-                  <a:schemeClr val="accent6">
-                    <a:lumMod val="75000"/>
-                  </a:schemeClr>
-                </a:solidFill>
-              </a:rPr>
-              <a:t/>
-            </a:r>
             <a:br>
-              <a:rPr lang="en-US" sz="1000" dirty="0" smtClean="0">
+              <a:rPr lang="en-US" sz="1000" dirty="0">
                 <a:solidFill>
                   <a:schemeClr val="accent6">
                     <a:lumMod val="75000"/>
@@ -3841,7 +3825,7 @@
               </a:rPr>
             </a:br>
             <a:r>
-              <a:rPr lang="en-US" sz="1000" dirty="0" err="1" smtClean="0">
+              <a:rPr lang="en-US" sz="1000" dirty="0" err="1">
                 <a:solidFill>
                   <a:schemeClr val="accent6">
                     <a:lumMod val="75000"/>
@@ -3851,7 +3835,7 @@
               <a:t>AvailableEvent</a:t>
             </a:r>
             <a:r>
-              <a:rPr lang="en-US" sz="1000" dirty="0" smtClean="0">
+              <a:rPr lang="en-US" sz="1000" dirty="0">
                 <a:solidFill>
                   <a:schemeClr val="accent6">
                     <a:lumMod val="75000"/>
@@ -3860,13 +3844,6 @@
               </a:rPr>
               <a:t>(Event)</a:t>
             </a:r>
-            <a:endParaRPr lang="en-US" sz="1000" dirty="0">
-              <a:solidFill>
-                <a:schemeClr val="accent6">
-                  <a:lumMod val="75000"/>
-                </a:schemeClr>
-              </a:solidFill>
-            </a:endParaRPr>
           </a:p>
         </p:txBody>
       </p:sp>
@@ -3875,7 +3852,7 @@
           <p:cNvPr id="66" name="Straight Arrow Connector 65">
             <a:extLst>
               <a:ext uri="{FF2B5EF4-FFF2-40B4-BE49-F238E27FC236}">
-                <a16:creationId xmlns:a16="http://schemas.microsoft.com/office/drawing/2014/main" xmlns="" id="{39916E2E-195A-4DC8-B025-B05FA87E6796}"/>
+                <a16:creationId xmlns:a16="http://schemas.microsoft.com/office/drawing/2014/main" id="{39916E2E-195A-4DC8-B025-B05FA87E6796}"/>
               </a:ext>
             </a:extLst>
           </p:cNvPr>
@@ -4005,21 +3982,8 @@
                   <a:srgbClr val="7030A0"/>
                 </a:solidFill>
               </a:rPr>
-              <a:t>d</a:t>
-            </a:r>
-            <a:r>
-              <a:rPr lang="en-US" dirty="0" smtClean="0">
-                <a:solidFill>
-                  <a:srgbClr val="7030A0"/>
-                </a:solidFill>
-              </a:rPr>
-              <a:t>elete(task)</a:t>
-            </a:r>
-            <a:endParaRPr lang="en-US" dirty="0">
-              <a:solidFill>
-                <a:srgbClr val="7030A0"/>
-              </a:solidFill>
-            </a:endParaRPr>
+              <a:t>delete(task)</a:t>
+            </a:r>
           </a:p>
         </p:txBody>
       </p:sp>
@@ -4148,23 +4112,15 @@
           <a:p>
             <a:pPr algn="l"/>
             <a:r>
-              <a:rPr lang="en-US" dirty="0" smtClean="0">
+              <a:rPr lang="en-US" dirty="0">
                 <a:solidFill>
                   <a:schemeClr val="tx1"/>
                 </a:solidFill>
               </a:rPr>
-              <a:t>loop     </a:t>
-            </a:r>
-            <a:r>
-              <a:rPr lang="en-US" dirty="0" smtClean="0">
-                <a:solidFill>
-                  <a:schemeClr val="tx1"/>
-                </a:solidFill>
-              </a:rPr>
-              <a:t>     </a:t>
-            </a:r>
-            <a:r>
-              <a:rPr lang="en-US" dirty="0" smtClean="0">
+              <a:t>loop          </a:t>
+            </a:r>
+            <a:r>
+              <a:rPr lang="en-US" dirty="0">
                 <a:solidFill>
                   <a:schemeClr val="tx1"/>
                 </a:solidFill>
@@ -4177,53 +4133,8 @@
                   </a:glow>
                 </a:effectLst>
               </a:rPr>
-              <a:t>[</a:t>
-            </a:r>
-            <a:r>
-              <a:rPr lang="en-US" dirty="0" smtClean="0">
-                <a:solidFill>
-                  <a:schemeClr val="tx1"/>
-                </a:solidFill>
-                <a:effectLst>
-                  <a:glow rad="127000">
-                    <a:schemeClr val="accent1">
-                      <a:lumMod val="20000"/>
-                      <a:lumOff val="80000"/>
-                    </a:schemeClr>
-                  </a:glow>
-                </a:effectLst>
-              </a:rPr>
-              <a:t>for all tasks from Event</a:t>
-            </a:r>
-            <a:r>
-              <a:rPr lang="en-US" dirty="0" smtClean="0">
-                <a:solidFill>
-                  <a:schemeClr val="tx1"/>
-                </a:solidFill>
-                <a:effectLst>
-                  <a:glow rad="127000">
-                    <a:schemeClr val="accent1">
-                      <a:lumMod val="20000"/>
-                      <a:lumOff val="80000"/>
-                    </a:schemeClr>
-                  </a:glow>
-                </a:effectLst>
-              </a:rPr>
-              <a:t>]</a:t>
-            </a:r>
-            <a:endParaRPr lang="en-US" dirty="0">
-              <a:solidFill>
-                <a:schemeClr val="tx1"/>
-              </a:solidFill>
-              <a:effectLst>
-                <a:glow rad="127000">
-                  <a:schemeClr val="accent1">
-                    <a:lumMod val="20000"/>
-                    <a:lumOff val="80000"/>
-                  </a:schemeClr>
-                </a:glow>
-              </a:effectLst>
-            </a:endParaRPr>
+              <a:t>[for all tasks from Event]</a:t>
+            </a:r>
           </a:p>
         </p:txBody>
       </p:sp>
@@ -4271,7 +4182,7 @@
           <a:p>
             <a:pPr algn="ctr"/>
             <a:r>
-              <a:rPr lang="en-US" sz="1500" dirty="0" smtClean="0">
+              <a:rPr lang="en-US" sz="1500" dirty="0">
                 <a:solidFill>
                   <a:schemeClr val="bg1"/>
                 </a:solidFill>
@@ -4279,20 +4190,12 @@
               <a:t>:</a:t>
             </a:r>
             <a:r>
-              <a:rPr lang="en-US" sz="1500" dirty="0" err="1" smtClean="0">
+              <a:rPr lang="en-US" sz="1500" dirty="0" err="1">
                 <a:solidFill>
                   <a:schemeClr val="bg1"/>
                 </a:solidFill>
               </a:rPr>
-              <a:t>Overwrite</a:t>
-            </a:r>
-            <a:r>
-              <a:rPr lang="en-US" sz="1500" dirty="0" err="1" smtClean="0">
-                <a:solidFill>
-                  <a:schemeClr val="bg1"/>
-                </a:solidFill>
-              </a:rPr>
-              <a:t>ImportConflictResolver</a:t>
+              <a:t>OverwriteImportConflictResolver</a:t>
             </a:r>
             <a:endParaRPr lang="en-SG" sz="1500" dirty="0">
               <a:solidFill>
@@ -4639,18 +4542,13 @@
           </a:lstStyle>
           <a:p>
             <a:r>
-              <a:rPr lang="en-US" sz="1200" dirty="0" smtClean="0">
+              <a:rPr lang="en-US" sz="1200" dirty="0">
                 <a:solidFill>
                   <a:srgbClr val="7030A0"/>
                 </a:solidFill>
               </a:rPr>
               <a:t>resolve(add(), delete(), task)</a:t>
             </a:r>
-            <a:endParaRPr lang="en-US" sz="1200" dirty="0">
-              <a:solidFill>
-                <a:srgbClr val="7030A0"/>
-              </a:solidFill>
-            </a:endParaRPr>
           </a:p>
         </p:txBody>
       </p:sp>
@@ -4790,18 +4688,10 @@
                   <a:schemeClr val="tx1"/>
                 </a:solidFill>
               </a:rPr>
-              <a:t>a</a:t>
-            </a:r>
-            <a:r>
-              <a:rPr lang="en-US" dirty="0" smtClean="0">
-                <a:solidFill>
-                  <a:schemeClr val="tx1"/>
-                </a:solidFill>
-              </a:rPr>
-              <a:t>lt               </a:t>
-            </a:r>
-            <a:r>
-              <a:rPr lang="en-US" dirty="0" smtClean="0">
+              <a:t>alt               </a:t>
+            </a:r>
+            <a:r>
+              <a:rPr lang="en-US" dirty="0">
                 <a:solidFill>
                   <a:schemeClr val="tx1"/>
                 </a:solidFill>
@@ -4816,19 +4706,6 @@
               </a:rPr>
               <a:t>[task already exists]</a:t>
             </a:r>
-            <a:endParaRPr lang="en-US" dirty="0">
-              <a:solidFill>
-                <a:schemeClr val="tx1"/>
-              </a:solidFill>
-              <a:effectLst>
-                <a:glow rad="127000">
-                  <a:schemeClr val="accent1">
-                    <a:lumMod val="20000"/>
-                    <a:lumOff val="80000"/>
-                  </a:schemeClr>
-                </a:glow>
-              </a:effectLst>
-            </a:endParaRPr>
           </a:p>
         </p:txBody>
       </p:sp>
@@ -5104,7 +4981,7 @@
           <a:p>
             <a:pPr algn="l"/>
             <a:r>
-              <a:rPr lang="en-US" dirty="0" smtClean="0">
+              <a:rPr lang="en-US" dirty="0">
                 <a:solidFill>
                   <a:schemeClr val="tx1"/>
                 </a:solidFill>
@@ -5112,7 +4989,7 @@
               <a:t>               </a:t>
             </a:r>
             <a:r>
-              <a:rPr lang="en-US" dirty="0" smtClean="0">
+              <a:rPr lang="en-US" dirty="0">
                 <a:solidFill>
                   <a:schemeClr val="tx1"/>
                 </a:solidFill>
@@ -5127,19 +5004,6 @@
               </a:rPr>
               <a:t>[else]</a:t>
             </a:r>
-            <a:endParaRPr lang="en-US" dirty="0">
-              <a:solidFill>
-                <a:schemeClr val="tx1"/>
-              </a:solidFill>
-              <a:effectLst>
-                <a:glow rad="127000">
-                  <a:schemeClr val="accent1">
-                    <a:lumMod val="20000"/>
-                    <a:lumOff val="80000"/>
-                  </a:schemeClr>
-                </a:glow>
-              </a:effectLst>
-            </a:endParaRPr>
           </a:p>
         </p:txBody>
       </p:sp>
@@ -5183,21 +5047,8 @@
                   <a:srgbClr val="7030A0"/>
                 </a:solidFill>
               </a:rPr>
-              <a:t>a</a:t>
-            </a:r>
-            <a:r>
-              <a:rPr lang="en-US" dirty="0" smtClean="0">
-                <a:solidFill>
-                  <a:srgbClr val="7030A0"/>
-                </a:solidFill>
-              </a:rPr>
-              <a:t>dd(task)</a:t>
-            </a:r>
-            <a:endParaRPr lang="en-US" dirty="0">
-              <a:solidFill>
-                <a:srgbClr val="7030A0"/>
-              </a:solidFill>
-            </a:endParaRPr>
+              <a:t>add(task)</a:t>
+            </a:r>
           </a:p>
         </p:txBody>
       </p:sp>
@@ -5439,21 +5290,8 @@
                   <a:srgbClr val="7030A0"/>
                 </a:solidFill>
               </a:rPr>
-              <a:t>a</a:t>
-            </a:r>
-            <a:r>
-              <a:rPr lang="en-US" dirty="0" smtClean="0">
-                <a:solidFill>
-                  <a:srgbClr val="7030A0"/>
-                </a:solidFill>
-              </a:rPr>
-              <a:t>dd(task)</a:t>
-            </a:r>
-            <a:endParaRPr lang="en-US" dirty="0">
-              <a:solidFill>
-                <a:srgbClr val="7030A0"/>
-              </a:solidFill>
-            </a:endParaRPr>
+              <a:t>add(task)</a:t>
+            </a:r>
           </a:p>
         </p:txBody>
       </p:sp>

</xml_diff>

<commit_message>
Update sijie ppp to cut space
</commit_message>
<xml_diff>
--- a/docs/diagrams/ImportConflictResolverSequenceDiagram.pptx
+++ b/docs/diagrams/ImportConflictResolverSequenceDiagram.pptx
@@ -208,7 +208,7 @@
           <a:p>
             <a:fld id="{F5CC4B3F-88C1-4FFA-B1B6-F41C21DC6924}" type="datetimeFigureOut">
               <a:rPr lang="en-US" smtClean="0"/>
-              <a:t>11-Nov-18</a:t>
+              <a:t>12-Nov-18</a:t>
             </a:fld>
             <a:endParaRPr lang="en-US"/>
           </a:p>
@@ -654,7 +654,7 @@
           <a:p>
             <a:fld id="{78C97017-6FC3-485B-9764-EAC9E56C1D49}" type="datetimeFigureOut">
               <a:rPr lang="en-US" smtClean="0"/>
-              <a:t>11-Nov-18</a:t>
+              <a:t>12-Nov-18</a:t>
             </a:fld>
             <a:endParaRPr lang="en-US"/>
           </a:p>
@@ -822,7 +822,7 @@
           <a:p>
             <a:fld id="{78C97017-6FC3-485B-9764-EAC9E56C1D49}" type="datetimeFigureOut">
               <a:rPr lang="en-US" smtClean="0"/>
-              <a:t>11-Nov-18</a:t>
+              <a:t>12-Nov-18</a:t>
             </a:fld>
             <a:endParaRPr lang="en-US"/>
           </a:p>
@@ -1000,7 +1000,7 @@
           <a:p>
             <a:fld id="{78C97017-6FC3-485B-9764-EAC9E56C1D49}" type="datetimeFigureOut">
               <a:rPr lang="en-US" smtClean="0"/>
-              <a:t>11-Nov-18</a:t>
+              <a:t>12-Nov-18</a:t>
             </a:fld>
             <a:endParaRPr lang="en-US"/>
           </a:p>
@@ -1168,7 +1168,7 @@
           <a:p>
             <a:fld id="{78C97017-6FC3-485B-9764-EAC9E56C1D49}" type="datetimeFigureOut">
               <a:rPr lang="en-US" smtClean="0"/>
-              <a:t>11-Nov-18</a:t>
+              <a:t>12-Nov-18</a:t>
             </a:fld>
             <a:endParaRPr lang="en-US"/>
           </a:p>
@@ -1413,7 +1413,7 @@
           <a:p>
             <a:fld id="{78C97017-6FC3-485B-9764-EAC9E56C1D49}" type="datetimeFigureOut">
               <a:rPr lang="en-US" smtClean="0"/>
-              <a:t>11-Nov-18</a:t>
+              <a:t>12-Nov-18</a:t>
             </a:fld>
             <a:endParaRPr lang="en-US"/>
           </a:p>
@@ -1698,7 +1698,7 @@
           <a:p>
             <a:fld id="{78C97017-6FC3-485B-9764-EAC9E56C1D49}" type="datetimeFigureOut">
               <a:rPr lang="en-US" smtClean="0"/>
-              <a:t>11-Nov-18</a:t>
+              <a:t>12-Nov-18</a:t>
             </a:fld>
             <a:endParaRPr lang="en-US"/>
           </a:p>
@@ -2117,7 +2117,7 @@
           <a:p>
             <a:fld id="{78C97017-6FC3-485B-9764-EAC9E56C1D49}" type="datetimeFigureOut">
               <a:rPr lang="en-US" smtClean="0"/>
-              <a:t>11-Nov-18</a:t>
+              <a:t>12-Nov-18</a:t>
             </a:fld>
             <a:endParaRPr lang="en-US"/>
           </a:p>
@@ -2234,7 +2234,7 @@
           <a:p>
             <a:fld id="{78C97017-6FC3-485B-9764-EAC9E56C1D49}" type="datetimeFigureOut">
               <a:rPr lang="en-US" smtClean="0"/>
-              <a:t>11-Nov-18</a:t>
+              <a:t>12-Nov-18</a:t>
             </a:fld>
             <a:endParaRPr lang="en-US"/>
           </a:p>
@@ -2329,7 +2329,7 @@
           <a:p>
             <a:fld id="{78C97017-6FC3-485B-9764-EAC9E56C1D49}" type="datetimeFigureOut">
               <a:rPr lang="en-US" smtClean="0"/>
-              <a:t>11-Nov-18</a:t>
+              <a:t>12-Nov-18</a:t>
             </a:fld>
             <a:endParaRPr lang="en-US"/>
           </a:p>
@@ -2604,7 +2604,7 @@
           <a:p>
             <a:fld id="{78C97017-6FC3-485B-9764-EAC9E56C1D49}" type="datetimeFigureOut">
               <a:rPr lang="en-US" smtClean="0"/>
-              <a:t>11-Nov-18</a:t>
+              <a:t>12-Nov-18</a:t>
             </a:fld>
             <a:endParaRPr lang="en-US"/>
           </a:p>
@@ -2856,7 +2856,7 @@
           <a:p>
             <a:fld id="{78C97017-6FC3-485B-9764-EAC9E56C1D49}" type="datetimeFigureOut">
               <a:rPr lang="en-US" smtClean="0"/>
-              <a:t>11-Nov-18</a:t>
+              <a:t>12-Nov-18</a:t>
             </a:fld>
             <a:endParaRPr lang="en-US"/>
           </a:p>
@@ -3067,7 +3067,7 @@
           <a:p>
             <a:fld id="{78C97017-6FC3-485B-9764-EAC9E56C1D49}" type="datetimeFigureOut">
               <a:rPr lang="en-US" smtClean="0"/>
-              <a:t>11-Nov-18</a:t>
+              <a:t>12-Nov-18</a:t>
             </a:fld>
             <a:endParaRPr lang="en-US"/>
           </a:p>
@@ -3451,7 +3451,7 @@
         <p:spPr>
           <a:xfrm>
             <a:off x="914400" y="152400"/>
-            <a:ext cx="6613373" cy="5475782"/>
+            <a:ext cx="7239000" cy="4267194"/>
           </a:xfrm>
           <a:prstGeom prst="roundRect">
             <a:avLst>
@@ -3511,8 +3511,8 @@
         </p:nvSpPr>
         <p:spPr>
           <a:xfrm>
-            <a:off x="1545442" y="1400330"/>
-            <a:ext cx="5398777" cy="3552514"/>
+            <a:off x="1868353" y="1321278"/>
+            <a:ext cx="5980247" cy="2717322"/>
           </a:xfrm>
           <a:prstGeom prst="rect">
             <a:avLst/>
@@ -3557,7 +3557,7 @@
         </p:nvSpPr>
         <p:spPr>
           <a:xfrm>
-            <a:off x="1293316" y="520584"/>
+            <a:off x="1616227" y="441532"/>
             <a:ext cx="2026926" cy="346760"/>
           </a:xfrm>
           <a:prstGeom prst="rect">
@@ -3626,8 +3626,8 @@
         </p:nvCxnSpPr>
         <p:spPr>
           <a:xfrm>
-            <a:off x="2306779" y="896999"/>
-            <a:ext cx="0" cy="4668453"/>
+            <a:off x="2629690" y="817947"/>
+            <a:ext cx="0" cy="3749040"/>
           </a:xfrm>
           <a:prstGeom prst="line">
             <a:avLst/>
@@ -3663,8 +3663,8 @@
         </p:nvSpPr>
         <p:spPr>
           <a:xfrm>
-            <a:off x="2234771" y="1247693"/>
-            <a:ext cx="152400" cy="4056149"/>
+            <a:off x="2557682" y="1168641"/>
+            <a:ext cx="152400" cy="3108960"/>
           </a:xfrm>
           <a:prstGeom prst="rect">
             <a:avLst/>
@@ -3715,8 +3715,8 @@
         </p:nvCxnSpPr>
         <p:spPr>
           <a:xfrm>
-            <a:off x="4877085" y="1126232"/>
-            <a:ext cx="0" cy="4349550"/>
+            <a:off x="5652483" y="1047180"/>
+            <a:ext cx="0" cy="3505966"/>
           </a:xfrm>
           <a:prstGeom prst="line">
             <a:avLst/>
@@ -3747,13 +3747,15 @@
       <p:cxnSp>
         <p:nvCxnSpPr>
           <p:cNvPr id="23" name="Straight Arrow Connector 22"/>
-          <p:cNvCxnSpPr/>
+          <p:cNvCxnSpPr>
+            <a:cxnSpLocks/>
+          </p:cNvCxnSpPr>
           <p:nvPr/>
         </p:nvCxnSpPr>
         <p:spPr>
           <a:xfrm>
-            <a:off x="733920" y="1251381"/>
-            <a:ext cx="1500851" cy="0"/>
+            <a:off x="228600" y="1172329"/>
+            <a:ext cx="2329082" cy="0"/>
           </a:xfrm>
           <a:prstGeom prst="straightConnector1">
             <a:avLst/>
@@ -3790,8 +3792,8 @@
         </p:nvSpPr>
         <p:spPr>
           <a:xfrm>
-            <a:off x="76200" y="963044"/>
-            <a:ext cx="2122567" cy="307777"/>
+            <a:off x="334687" y="990025"/>
+            <a:ext cx="2122567" cy="153888"/>
           </a:xfrm>
           <a:prstGeom prst="rect">
             <a:avLst/>
@@ -3813,26 +3815,7 @@
                   </a:schemeClr>
                 </a:solidFill>
               </a:rPr>
-              <a:t>handleImportData</a:t>
-            </a:r>
-            <a:br>
-              <a:rPr lang="en-US" sz="1000" dirty="0">
-                <a:solidFill>
-                  <a:schemeClr val="accent6">
-                    <a:lumMod val="75000"/>
-                  </a:schemeClr>
-                </a:solidFill>
-              </a:rPr>
-            </a:br>
-            <a:r>
-              <a:rPr lang="en-US" sz="1000" dirty="0" err="1">
-                <a:solidFill>
-                  <a:schemeClr val="accent6">
-                    <a:lumMod val="75000"/>
-                  </a:schemeClr>
-                </a:solidFill>
-              </a:rPr>
-              <a:t>AvailableEvent</a:t>
+              <a:t>handleImportDataAvailableEvent</a:t>
             </a:r>
             <a:r>
               <a:rPr lang="en-US" sz="1000" dirty="0">
@@ -3863,8 +3846,8 @@
         </p:nvCxnSpPr>
         <p:spPr>
           <a:xfrm flipV="1">
-            <a:off x="2522513" y="2263693"/>
-            <a:ext cx="2273344" cy="15071"/>
+            <a:off x="2795263" y="2080944"/>
+            <a:ext cx="2750746" cy="15071"/>
           </a:xfrm>
           <a:prstGeom prst="straightConnector1">
             <a:avLst/>
@@ -3899,8 +3882,8 @@
         </p:nvSpPr>
         <p:spPr>
           <a:xfrm>
-            <a:off x="4795857" y="2196229"/>
-            <a:ext cx="154408" cy="822960"/>
+            <a:off x="5571255" y="2060615"/>
+            <a:ext cx="154408" cy="731520"/>
           </a:xfrm>
           <a:prstGeom prst="rect">
             <a:avLst/>
@@ -3950,7 +3933,7 @@
         </p:nvSpPr>
         <p:spPr>
           <a:xfrm>
-            <a:off x="5304420" y="2231937"/>
+            <a:off x="6079818" y="2105750"/>
             <a:ext cx="1955216" cy="215444"/>
           </a:xfrm>
           <a:prstGeom prst="rect">
@@ -3997,8 +3980,8 @@
         </p:nvCxnSpPr>
         <p:spPr>
           <a:xfrm>
-            <a:off x="2509383" y="3019964"/>
-            <a:ext cx="2348067" cy="0"/>
+            <a:off x="2830849" y="2790335"/>
+            <a:ext cx="2841161" cy="0"/>
           </a:xfrm>
           <a:prstGeom prst="straightConnector1">
             <a:avLst/>
@@ -4035,7 +4018,7 @@
         </p:nvSpPr>
         <p:spPr>
           <a:xfrm flipV="1">
-            <a:off x="1552289" y="1399120"/>
+            <a:off x="1875200" y="1320068"/>
             <a:ext cx="632695" cy="323484"/>
           </a:xfrm>
           <a:prstGeom prst="snip1Rect">
@@ -4085,7 +4068,7 @@
         </p:nvSpPr>
         <p:spPr>
           <a:xfrm>
-            <a:off x="1740028" y="1456051"/>
+            <a:off x="2062939" y="1376999"/>
             <a:ext cx="2918192" cy="215444"/>
           </a:xfrm>
           <a:prstGeom prst="rect">
@@ -4146,7 +4129,7 @@
         </p:nvSpPr>
         <p:spPr>
           <a:xfrm>
-            <a:off x="3500722" y="525547"/>
+            <a:off x="4276120" y="446495"/>
             <a:ext cx="2833898" cy="336834"/>
           </a:xfrm>
           <a:prstGeom prst="rect">
@@ -4213,7 +4196,7 @@
         </p:nvSpPr>
         <p:spPr>
           <a:xfrm>
-            <a:off x="4799845" y="867454"/>
+            <a:off x="5575243" y="788402"/>
             <a:ext cx="154479" cy="258778"/>
           </a:xfrm>
           <a:prstGeom prst="rect">
@@ -4264,8 +4247,8 @@
         </p:nvSpPr>
         <p:spPr>
           <a:xfrm>
-            <a:off x="2360381" y="1846760"/>
-            <a:ext cx="154408" cy="2834640"/>
+            <a:off x="2683292" y="1711146"/>
+            <a:ext cx="154408" cy="2194560"/>
           </a:xfrm>
           <a:prstGeom prst="rect">
             <a:avLst/>
@@ -4318,8 +4301,8 @@
         </p:nvSpPr>
         <p:spPr>
           <a:xfrm>
-            <a:off x="2420301" y="1691217"/>
-            <a:ext cx="255113" cy="138851"/>
+            <a:off x="2743212" y="1612165"/>
+            <a:ext cx="255113" cy="91440"/>
           </a:xfrm>
           <a:custGeom>
             <a:avLst/>
@@ -4469,7 +4452,7 @@
         </p:nvSpPr>
         <p:spPr>
           <a:xfrm>
-            <a:off x="2226062" y="874839"/>
+            <a:off x="2548973" y="795787"/>
             <a:ext cx="168896" cy="182880"/>
           </a:xfrm>
           <a:prstGeom prst="rect">
@@ -4516,7 +4499,7 @@
         </p:nvSpPr>
         <p:spPr>
           <a:xfrm>
-            <a:off x="2448420" y="2310466"/>
+            <a:off x="2771331" y="2231414"/>
             <a:ext cx="2084593" cy="184666"/>
           </a:xfrm>
           <a:prstGeom prst="rect">
@@ -4560,8 +4543,8 @@
         </p:nvSpPr>
         <p:spPr>
           <a:xfrm>
-            <a:off x="1636879" y="1961983"/>
-            <a:ext cx="5154941" cy="2574606"/>
+            <a:off x="1959790" y="1807515"/>
+            <a:ext cx="5710149" cy="1850085"/>
           </a:xfrm>
           <a:prstGeom prst="rect">
             <a:avLst/>
@@ -4606,7 +4589,7 @@
         </p:nvSpPr>
         <p:spPr>
           <a:xfrm flipV="1">
-            <a:off x="1636881" y="1960773"/>
+            <a:off x="1959792" y="1806305"/>
             <a:ext cx="525344" cy="268598"/>
           </a:xfrm>
           <a:prstGeom prst="snip1Rect">
@@ -4656,7 +4639,7 @@
         </p:nvSpPr>
         <p:spPr>
           <a:xfrm>
-            <a:off x="1788743" y="1979770"/>
+            <a:off x="2111654" y="1825302"/>
             <a:ext cx="2918192" cy="215444"/>
           </a:xfrm>
           <a:prstGeom prst="rect">
@@ -4717,8 +4700,8 @@
         </p:nvSpPr>
         <p:spPr>
           <a:xfrm>
-            <a:off x="4884292" y="2427782"/>
-            <a:ext cx="168896" cy="182880"/>
+            <a:off x="5659690" y="2282741"/>
+            <a:ext cx="168896" cy="137160"/>
           </a:xfrm>
           <a:prstGeom prst="rect">
             <a:avLst/>
@@ -4764,8 +4747,8 @@
         </p:nvSpPr>
         <p:spPr>
           <a:xfrm>
-            <a:off x="4999076" y="2302077"/>
-            <a:ext cx="255113" cy="145304"/>
+            <a:off x="5774474" y="2194560"/>
+            <a:ext cx="255113" cy="91440"/>
           </a:xfrm>
           <a:custGeom>
             <a:avLst/>
@@ -4911,15 +4894,14 @@
         <p:nvCxnSpPr>
           <p:cNvPr id="21" name="Straight Connector 20"/>
           <p:cNvCxnSpPr>
-            <a:stCxn id="52" idx="1"/>
-            <a:endCxn id="52" idx="3"/>
+            <a:cxnSpLocks/>
           </p:cNvCxnSpPr>
           <p:nvPr/>
         </p:nvCxnSpPr>
         <p:spPr>
           <a:xfrm>
-            <a:off x="1636879" y="3249286"/>
-            <a:ext cx="5154941" cy="0"/>
+            <a:off x="1959790" y="2939183"/>
+            <a:ext cx="5710149" cy="0"/>
           </a:xfrm>
           <a:prstGeom prst="line">
             <a:avLst/>
@@ -4954,7 +4936,7 @@
         </p:nvSpPr>
         <p:spPr>
           <a:xfrm>
-            <a:off x="1968628" y="3271755"/>
+            <a:off x="2291539" y="2971800"/>
             <a:ext cx="2918192" cy="215444"/>
           </a:xfrm>
           <a:prstGeom prst="rect">
@@ -5015,7 +4997,7 @@
         </p:nvSpPr>
         <p:spPr>
           <a:xfrm>
-            <a:off x="2225693" y="3473049"/>
+            <a:off x="2548604" y="3167749"/>
             <a:ext cx="1955216" cy="215444"/>
           </a:xfrm>
           <a:prstGeom prst="rect">
@@ -5060,8 +5042,8 @@
         </p:nvSpPr>
         <p:spPr>
           <a:xfrm>
-            <a:off x="2439937" y="3692702"/>
-            <a:ext cx="168896" cy="457200"/>
+            <a:off x="2762848" y="3333946"/>
+            <a:ext cx="168896" cy="182880"/>
           </a:xfrm>
           <a:prstGeom prst="rect">
             <a:avLst/>
@@ -5107,8 +5089,8 @@
         </p:nvSpPr>
         <p:spPr>
           <a:xfrm>
-            <a:off x="2554721" y="3527683"/>
-            <a:ext cx="255113" cy="138851"/>
+            <a:off x="2877632" y="3247535"/>
+            <a:ext cx="255113" cy="91440"/>
           </a:xfrm>
           <a:custGeom>
             <a:avLst/>
@@ -5258,7 +5240,7 @@
         </p:nvSpPr>
         <p:spPr>
           <a:xfrm>
-            <a:off x="5304420" y="2587093"/>
+            <a:off x="6079818" y="2413771"/>
             <a:ext cx="1955216" cy="215444"/>
           </a:xfrm>
           <a:prstGeom prst="rect">
@@ -5303,8 +5285,8 @@
         </p:nvSpPr>
         <p:spPr>
           <a:xfrm>
-            <a:off x="4884292" y="2782938"/>
-            <a:ext cx="168896" cy="182880"/>
+            <a:off x="5659690" y="2581335"/>
+            <a:ext cx="168896" cy="137160"/>
           </a:xfrm>
           <a:prstGeom prst="rect">
             <a:avLst/>
@@ -5350,8 +5332,8 @@
         </p:nvSpPr>
         <p:spPr>
           <a:xfrm>
-            <a:off x="4999076" y="2657233"/>
-            <a:ext cx="255113" cy="145304"/>
+            <a:off x="5774474" y="2502765"/>
+            <a:ext cx="255113" cy="91440"/>
           </a:xfrm>
           <a:custGeom>
             <a:avLst/>

</xml_diff>

<commit_message>
Cut even more words
</commit_message>
<xml_diff>
--- a/docs/diagrams/ImportConflictResolverSequenceDiagram.pptx
+++ b/docs/diagrams/ImportConflictResolverSequenceDiagram.pptx
@@ -3450,8 +3450,8 @@
         </p:nvSpPr>
         <p:spPr>
           <a:xfrm>
-            <a:off x="914400" y="152400"/>
-            <a:ext cx="7239000" cy="4267194"/>
+            <a:off x="1066800" y="152400"/>
+            <a:ext cx="7818713" cy="4267194"/>
           </a:xfrm>
           <a:prstGeom prst="roundRect">
             <a:avLst>
@@ -3511,7 +3511,7 @@
         </p:nvSpPr>
         <p:spPr>
           <a:xfrm>
-            <a:off x="1868353" y="1321278"/>
+            <a:off x="2600466" y="1321278"/>
             <a:ext cx="5980247" cy="2717322"/>
           </a:xfrm>
           <a:prstGeom prst="rect">
@@ -3557,7 +3557,7 @@
         </p:nvSpPr>
         <p:spPr>
           <a:xfrm>
-            <a:off x="1616227" y="441532"/>
+            <a:off x="2348340" y="441532"/>
             <a:ext cx="2026926" cy="346760"/>
           </a:xfrm>
           <a:prstGeom prst="rect">
@@ -3626,7 +3626,7 @@
         </p:nvCxnSpPr>
         <p:spPr>
           <a:xfrm>
-            <a:off x="2629690" y="817947"/>
+            <a:off x="3361803" y="817947"/>
             <a:ext cx="0" cy="3749040"/>
           </a:xfrm>
           <a:prstGeom prst="line">
@@ -3663,7 +3663,7 @@
         </p:nvSpPr>
         <p:spPr>
           <a:xfrm>
-            <a:off x="2557682" y="1168641"/>
+            <a:off x="3289795" y="1168641"/>
             <a:ext cx="152400" cy="3108960"/>
           </a:xfrm>
           <a:prstGeom prst="rect">
@@ -3715,7 +3715,7 @@
         </p:nvCxnSpPr>
         <p:spPr>
           <a:xfrm>
-            <a:off x="5652483" y="1047180"/>
+            <a:off x="6384596" y="1047180"/>
             <a:ext cx="0" cy="3505966"/>
           </a:xfrm>
           <a:prstGeom prst="line">
@@ -3754,8 +3754,8 @@
         </p:nvCxnSpPr>
         <p:spPr>
           <a:xfrm>
-            <a:off x="228600" y="1172329"/>
-            <a:ext cx="2329082" cy="0"/>
+            <a:off x="609600" y="1172329"/>
+            <a:ext cx="2680195" cy="0"/>
           </a:xfrm>
           <a:prstGeom prst="straightConnector1">
             <a:avLst/>
@@ -3792,7 +3792,7 @@
         </p:nvSpPr>
         <p:spPr>
           <a:xfrm>
-            <a:off x="334687" y="990025"/>
+            <a:off x="1066800" y="990025"/>
             <a:ext cx="2122567" cy="153888"/>
           </a:xfrm>
           <a:prstGeom prst="rect">
@@ -3846,7 +3846,7 @@
         </p:nvCxnSpPr>
         <p:spPr>
           <a:xfrm flipV="1">
-            <a:off x="2795263" y="2080944"/>
+            <a:off x="3527376" y="2080944"/>
             <a:ext cx="2750746" cy="15071"/>
           </a:xfrm>
           <a:prstGeom prst="straightConnector1">
@@ -3882,7 +3882,7 @@
         </p:nvSpPr>
         <p:spPr>
           <a:xfrm>
-            <a:off x="5571255" y="2060615"/>
+            <a:off x="6303368" y="2060615"/>
             <a:ext cx="154408" cy="731520"/>
           </a:xfrm>
           <a:prstGeom prst="rect">
@@ -3933,7 +3933,7 @@
         </p:nvSpPr>
         <p:spPr>
           <a:xfrm>
-            <a:off x="6079818" y="2105750"/>
+            <a:off x="6811931" y="2105750"/>
             <a:ext cx="1955216" cy="215444"/>
           </a:xfrm>
           <a:prstGeom prst="rect">
@@ -3980,7 +3980,7 @@
         </p:nvCxnSpPr>
         <p:spPr>
           <a:xfrm>
-            <a:off x="2830849" y="2790335"/>
+            <a:off x="3562962" y="2790335"/>
             <a:ext cx="2841161" cy="0"/>
           </a:xfrm>
           <a:prstGeom prst="straightConnector1">
@@ -4018,7 +4018,7 @@
         </p:nvSpPr>
         <p:spPr>
           <a:xfrm flipV="1">
-            <a:off x="1875200" y="1320068"/>
+            <a:off x="2607313" y="1320068"/>
             <a:ext cx="632695" cy="323484"/>
           </a:xfrm>
           <a:prstGeom prst="snip1Rect">
@@ -4068,7 +4068,7 @@
         </p:nvSpPr>
         <p:spPr>
           <a:xfrm>
-            <a:off x="2062939" y="1376999"/>
+            <a:off x="2795052" y="1376999"/>
             <a:ext cx="2918192" cy="215444"/>
           </a:xfrm>
           <a:prstGeom prst="rect">
@@ -4116,7 +4116,7 @@
                   </a:glow>
                 </a:effectLst>
               </a:rPr>
-              <a:t>[for all tasks from Event]</a:t>
+              <a:t>[for all tasks in Event]</a:t>
             </a:r>
           </a:p>
         </p:txBody>
@@ -4129,7 +4129,7 @@
         </p:nvSpPr>
         <p:spPr>
           <a:xfrm>
-            <a:off x="4276120" y="446495"/>
+            <a:off x="5008233" y="446495"/>
             <a:ext cx="2833898" cy="336834"/>
           </a:xfrm>
           <a:prstGeom prst="rect">
@@ -4196,7 +4196,7 @@
         </p:nvSpPr>
         <p:spPr>
           <a:xfrm>
-            <a:off x="5575243" y="788402"/>
+            <a:off x="6307356" y="788402"/>
             <a:ext cx="154479" cy="258778"/>
           </a:xfrm>
           <a:prstGeom prst="rect">
@@ -4247,7 +4247,7 @@
         </p:nvSpPr>
         <p:spPr>
           <a:xfrm>
-            <a:off x="2683292" y="1711146"/>
+            <a:off x="3415405" y="1711146"/>
             <a:ext cx="154408" cy="2194560"/>
           </a:xfrm>
           <a:prstGeom prst="rect">
@@ -4301,7 +4301,7 @@
         </p:nvSpPr>
         <p:spPr>
           <a:xfrm>
-            <a:off x="2743212" y="1612165"/>
+            <a:off x="3475325" y="1612165"/>
             <a:ext cx="255113" cy="91440"/>
           </a:xfrm>
           <a:custGeom>
@@ -4452,7 +4452,7 @@
         </p:nvSpPr>
         <p:spPr>
           <a:xfrm>
-            <a:off x="2548973" y="795787"/>
+            <a:off x="3281086" y="795787"/>
             <a:ext cx="168896" cy="182880"/>
           </a:xfrm>
           <a:prstGeom prst="rect">
@@ -4499,7 +4499,7 @@
         </p:nvSpPr>
         <p:spPr>
           <a:xfrm>
-            <a:off x="2771331" y="2231414"/>
+            <a:off x="3503444" y="2231414"/>
             <a:ext cx="2084593" cy="184666"/>
           </a:xfrm>
           <a:prstGeom prst="rect">
@@ -4543,7 +4543,7 @@
         </p:nvSpPr>
         <p:spPr>
           <a:xfrm>
-            <a:off x="1959790" y="1807515"/>
+            <a:off x="2691903" y="1807515"/>
             <a:ext cx="5710149" cy="1850085"/>
           </a:xfrm>
           <a:prstGeom prst="rect">
@@ -4589,7 +4589,7 @@
         </p:nvSpPr>
         <p:spPr>
           <a:xfrm flipV="1">
-            <a:off x="1959792" y="1806305"/>
+            <a:off x="2691905" y="1806305"/>
             <a:ext cx="525344" cy="268598"/>
           </a:xfrm>
           <a:prstGeom prst="snip1Rect">
@@ -4639,7 +4639,7 @@
         </p:nvSpPr>
         <p:spPr>
           <a:xfrm>
-            <a:off x="2111654" y="1825302"/>
+            <a:off x="2843767" y="1825302"/>
             <a:ext cx="2918192" cy="215444"/>
           </a:xfrm>
           <a:prstGeom prst="rect">
@@ -4700,7 +4700,7 @@
         </p:nvSpPr>
         <p:spPr>
           <a:xfrm>
-            <a:off x="5659690" y="2282741"/>
+            <a:off x="6391803" y="2282741"/>
             <a:ext cx="168896" cy="137160"/>
           </a:xfrm>
           <a:prstGeom prst="rect">
@@ -4747,7 +4747,7 @@
         </p:nvSpPr>
         <p:spPr>
           <a:xfrm>
-            <a:off x="5774474" y="2194560"/>
+            <a:off x="6506587" y="2194560"/>
             <a:ext cx="255113" cy="91440"/>
           </a:xfrm>
           <a:custGeom>
@@ -4900,7 +4900,7 @@
         </p:nvCxnSpPr>
         <p:spPr>
           <a:xfrm>
-            <a:off x="1959790" y="2939183"/>
+            <a:off x="2691903" y="2939183"/>
             <a:ext cx="5710149" cy="0"/>
           </a:xfrm>
           <a:prstGeom prst="line">
@@ -4936,7 +4936,7 @@
         </p:nvSpPr>
         <p:spPr>
           <a:xfrm>
-            <a:off x="2291539" y="2971800"/>
+            <a:off x="3023652" y="2971800"/>
             <a:ext cx="2918192" cy="215444"/>
           </a:xfrm>
           <a:prstGeom prst="rect">
@@ -4997,7 +4997,7 @@
         </p:nvSpPr>
         <p:spPr>
           <a:xfrm>
-            <a:off x="2548604" y="3167749"/>
+            <a:off x="3280717" y="3167749"/>
             <a:ext cx="1955216" cy="215444"/>
           </a:xfrm>
           <a:prstGeom prst="rect">
@@ -5042,7 +5042,7 @@
         </p:nvSpPr>
         <p:spPr>
           <a:xfrm>
-            <a:off x="2762848" y="3333946"/>
+            <a:off x="3494961" y="3333946"/>
             <a:ext cx="168896" cy="182880"/>
           </a:xfrm>
           <a:prstGeom prst="rect">
@@ -5089,7 +5089,7 @@
         </p:nvSpPr>
         <p:spPr>
           <a:xfrm>
-            <a:off x="2877632" y="3247535"/>
+            <a:off x="3609745" y="3247535"/>
             <a:ext cx="255113" cy="91440"/>
           </a:xfrm>
           <a:custGeom>
@@ -5240,7 +5240,7 @@
         </p:nvSpPr>
         <p:spPr>
           <a:xfrm>
-            <a:off x="6079818" y="2413771"/>
+            <a:off x="6811931" y="2413771"/>
             <a:ext cx="1955216" cy="215444"/>
           </a:xfrm>
           <a:prstGeom prst="rect">
@@ -5285,7 +5285,7 @@
         </p:nvSpPr>
         <p:spPr>
           <a:xfrm>
-            <a:off x="5659690" y="2581335"/>
+            <a:off x="6391803" y="2581335"/>
             <a:ext cx="168896" cy="137160"/>
           </a:xfrm>
           <a:prstGeom prst="rect">
@@ -5332,7 +5332,7 @@
         </p:nvSpPr>
         <p:spPr>
           <a:xfrm>
-            <a:off x="5774474" y="2502765"/>
+            <a:off x="6506587" y="2502765"/>
             <a:ext cx="255113" cy="91440"/>
           </a:xfrm>
           <a:custGeom>

</xml_diff>